<commit_message>
ppt add github link
</commit_message>
<xml_diff>
--- a/slides/presentation.pptx
+++ b/slides/presentation.pptx
@@ -164,6 +164,14 @@
       </a:defRPr>
     </a:lvl9pPr>
   </p:defaultTextStyle>
+  <p:extLst>
+    <p:ext uri="{EFAFB233-063F-42B5-8137-9DF3F51BA10A}">
+      <p15:sldGuideLst xmlns:p15="http://schemas.microsoft.com/office/powerpoint/2012/main"/>
+    </p:ext>
+    <p:ext uri="{2D200454-40CA-4A62-9FC3-DE9A4176ACB9}">
+      <p15:notesGuideLst xmlns:p15="http://schemas.microsoft.com/office/powerpoint/2012/main"/>
+    </p:ext>
+  </p:extLst>
 </p:presentation>
 </file>
 
@@ -261,7 +269,7 @@
           <a:p>
             <a:fld id="{06CCAAB9-E8F1-194A-80E4-ADBF4ECC99CF}" type="datetimeFigureOut">
               <a:rPr lang="en-US" smtClean="0"/>
-              <a:t>12/19/22</a:t>
+              <a:t>12/20/22</a:t>
             </a:fld>
             <a:endParaRPr lang="en-US"/>
           </a:p>
@@ -942,7 +950,7 @@
           <a:p>
             <a:fld id="{352231F8-B02B-EC45-BF73-DDB8D4BD02E5}" type="datetimeFigureOut">
               <a:rPr lang="en-US" smtClean="0"/>
-              <a:t>12/19/22</a:t>
+              <a:t>12/20/22</a:t>
             </a:fld>
             <a:endParaRPr lang="en-US"/>
           </a:p>
@@ -1539,7 +1547,7 @@
             <a:fld id="{87DE6118-2437-4B30-8E3C-4D2BE6020583}" type="datetimeFigureOut">
               <a:rPr lang="en-US" dirty="0"/>
               <a:pPr/>
-              <a:t>12/17/22</a:t>
+              <a:t>12/20/22</a:t>
             </a:fld>
             <a:endParaRPr lang="en-US" dirty="0"/>
           </a:p>
@@ -1865,7 +1873,7 @@
           <a:p>
             <a:fld id="{87DE6118-2437-4B30-8E3C-4D2BE6020583}" type="datetimeFigureOut">
               <a:rPr lang="en-US" dirty="0"/>
-              <a:t>12/17/22</a:t>
+              <a:t>12/20/22</a:t>
             </a:fld>
             <a:endParaRPr lang="en-US" dirty="0"/>
           </a:p>
@@ -2040,7 +2048,7 @@
           <a:p>
             <a:fld id="{87DE6118-2437-4B30-8E3C-4D2BE6020583}" type="datetimeFigureOut">
               <a:rPr lang="en-US" dirty="0"/>
-              <a:t>12/17/22</a:t>
+              <a:t>12/20/22</a:t>
             </a:fld>
             <a:endParaRPr lang="en-US" dirty="0"/>
           </a:p>
@@ -2205,7 +2213,7 @@
           <a:p>
             <a:fld id="{87DE6118-2437-4B30-8E3C-4D2BE6020583}" type="datetimeFigureOut">
               <a:rPr lang="en-US" dirty="0"/>
-              <a:t>12/17/22</a:t>
+              <a:t>12/20/22</a:t>
             </a:fld>
             <a:endParaRPr lang="en-US" dirty="0"/>
           </a:p>
@@ -2473,7 +2481,7 @@
             <a:fld id="{87DE6118-2437-4B30-8E3C-4D2BE6020583}" type="datetimeFigureOut">
               <a:rPr lang="en-US" dirty="0"/>
               <a:pPr/>
-              <a:t>12/17/22</a:t>
+              <a:t>12/20/22</a:t>
             </a:fld>
             <a:endParaRPr lang="en-US" dirty="0"/>
           </a:p>
@@ -2863,7 +2871,7 @@
           <a:p>
             <a:fld id="{87DE6118-2437-4B30-8E3C-4D2BE6020583}" type="datetimeFigureOut">
               <a:rPr lang="en-US" dirty="0"/>
-              <a:t>12/17/22</a:t>
+              <a:t>12/20/22</a:t>
             </a:fld>
             <a:endParaRPr lang="en-US" dirty="0"/>
           </a:p>
@@ -3335,7 +3343,7 @@
           <a:p>
             <a:fld id="{87DE6118-2437-4B30-8E3C-4D2BE6020583}" type="datetimeFigureOut">
               <a:rPr lang="en-US" dirty="0"/>
-              <a:t>12/17/22</a:t>
+              <a:t>12/20/22</a:t>
             </a:fld>
             <a:endParaRPr lang="en-US" dirty="0"/>
           </a:p>
@@ -3448,7 +3456,7 @@
           <a:p>
             <a:fld id="{87DE6118-2437-4B30-8E3C-4D2BE6020583}" type="datetimeFigureOut">
               <a:rPr lang="en-US" dirty="0"/>
-              <a:t>12/17/22</a:t>
+              <a:t>12/20/22</a:t>
             </a:fld>
             <a:endParaRPr lang="en-US" dirty="0"/>
           </a:p>
@@ -3538,7 +3546,7 @@
           <a:p>
             <a:fld id="{87DE6118-2437-4B30-8E3C-4D2BE6020583}" type="datetimeFigureOut">
               <a:rPr lang="en-US" dirty="0"/>
-              <a:t>12/17/22</a:t>
+              <a:t>12/20/22</a:t>
             </a:fld>
             <a:endParaRPr lang="en-US" dirty="0"/>
           </a:p>
@@ -3880,7 +3888,7 @@
             <a:fld id="{87DE6118-2437-4B30-8E3C-4D2BE6020583}" type="datetimeFigureOut">
               <a:rPr lang="en-US" dirty="0"/>
               <a:pPr/>
-              <a:t>12/17/22</a:t>
+              <a:t>12/20/22</a:t>
             </a:fld>
             <a:endParaRPr lang="en-US" dirty="0"/>
           </a:p>
@@ -4265,7 +4273,7 @@
             <a:fld id="{87DE6118-2437-4B30-8E3C-4D2BE6020583}" type="datetimeFigureOut">
               <a:rPr lang="en-US" dirty="0"/>
               <a:pPr/>
-              <a:t>12/17/22</a:t>
+              <a:t>12/20/22</a:t>
             </a:fld>
             <a:endParaRPr lang="en-US" dirty="0"/>
           </a:p>
@@ -4542,7 +4550,7 @@
             <a:fld id="{87DE6118-2437-4B30-8E3C-4D2BE6020583}" type="datetimeFigureOut">
               <a:rPr lang="en-US" dirty="0"/>
               <a:pPr/>
-              <a:t>12/17/22</a:t>
+              <a:t>12/20/22</a:t>
             </a:fld>
             <a:endParaRPr lang="en-US" dirty="0"/>
           </a:p>
@@ -5914,8 +5922,8 @@
           </a:p>
         </p:txBody>
       </p:sp>
-      <mc:AlternateContent xmlns:mc="http://schemas.openxmlformats.org/markup-compatibility/2006">
-        <mc:Choice xmlns:a14="http://schemas.microsoft.com/office/drawing/2010/main" Requires="a14">
+      <mc:AlternateContent xmlns:mc="http://schemas.openxmlformats.org/markup-compatibility/2006" xmlns:a14="http://schemas.microsoft.com/office/drawing/2010/main">
+        <mc:Choice Requires="a14">
           <p:sp>
             <p:nvSpPr>
               <p:cNvPr id="3" name="Content Placeholder 2">
@@ -6303,7 +6311,7 @@
             </p:txBody>
           </p:sp>
         </mc:Choice>
-        <mc:Fallback>
+        <mc:Fallback xmlns="">
           <p:sp>
             <p:nvSpPr>
               <p:cNvPr id="3" name="Content Placeholder 2">
@@ -6737,7 +6745,7 @@
         <p:spPr/>
         <p:txBody>
           <a:bodyPr>
-            <a:normAutofit lnSpcReduction="10000"/>
+            <a:normAutofit fontScale="85000" lnSpcReduction="10000"/>
           </a:bodyPr>
           <a:lstStyle/>
           <a:p>
@@ -6784,6 +6792,38 @@
               <a:rPr lang="en-US" dirty="0"/>
               <a:t>Side: An entropy analysis is applied on the indicators to check the indicator data quality. </a:t>
             </a:r>
+          </a:p>
+          <a:p>
+            <a:r>
+              <a:rPr lang="en-US" dirty="0"/>
+              <a:t>The project can also be found: </a:t>
+            </a:r>
+            <a:r>
+              <a:rPr lang="en-US" dirty="0">
+                <a:hlinkClick r:id="rId2"/>
+              </a:rPr>
+              <a:t>https://github.com/harrisyang611/timothy_final_project</a:t>
+            </a:r>
+            <a:endParaRPr lang="en-US" dirty="0"/>
+          </a:p>
+          <a:p>
+            <a:r>
+              <a:rPr lang="en-US" dirty="0"/>
+              <a:t>With the timothy compiled packages: </a:t>
+            </a:r>
+            <a:r>
+              <a:rPr lang="en-US" dirty="0">
+                <a:hlinkClick r:id="rId3"/>
+              </a:rPr>
+              <a:t>https://github.com/harrisyang611/timothy_master_indicator</a:t>
+            </a:r>
+            <a:endParaRPr lang="en-US" dirty="0"/>
+          </a:p>
+          <a:p>
+            <a:pPr marL="0" indent="0">
+              <a:buNone/>
+            </a:pPr>
+            <a:endParaRPr lang="en-US" dirty="0"/>
           </a:p>
           <a:p>
             <a:endParaRPr lang="en-US" dirty="0"/>
@@ -8222,8 +8262,8 @@
           </a:prstGeom>
         </p:spPr>
       </p:pic>
-      <mc:AlternateContent xmlns:mc="http://schemas.openxmlformats.org/markup-compatibility/2006">
-        <mc:Choice xmlns:p14="http://schemas.microsoft.com/office/powerpoint/2010/main" Requires="p14">
+      <mc:AlternateContent xmlns:mc="http://schemas.openxmlformats.org/markup-compatibility/2006" xmlns:p14="http://schemas.microsoft.com/office/powerpoint/2010/main">
+        <mc:Choice Requires="p14">
           <p:contentPart p14:bwMode="auto" r:id="rId3">
             <p14:nvContentPartPr>
               <p14:cNvPr id="6" name="Ink 5">
@@ -8242,7 +8282,7 @@
             </p14:xfrm>
           </p:contentPart>
         </mc:Choice>
-        <mc:Fallback>
+        <mc:Fallback xmlns="">
           <p:pic>
             <p:nvPicPr>
               <p:cNvPr id="6" name="Ink 5">
@@ -8273,8 +8313,8 @@
           </p:pic>
         </mc:Fallback>
       </mc:AlternateContent>
-      <mc:AlternateContent xmlns:mc="http://schemas.openxmlformats.org/markup-compatibility/2006">
-        <mc:Choice xmlns:p14="http://schemas.microsoft.com/office/powerpoint/2010/main" Requires="p14">
+      <mc:AlternateContent xmlns:mc="http://schemas.openxmlformats.org/markup-compatibility/2006" xmlns:p14="http://schemas.microsoft.com/office/powerpoint/2010/main">
+        <mc:Choice Requires="p14">
           <p:contentPart p14:bwMode="auto" r:id="rId5">
             <p14:nvContentPartPr>
               <p14:cNvPr id="7" name="Ink 6">
@@ -8293,7 +8333,7 @@
             </p14:xfrm>
           </p:contentPart>
         </mc:Choice>
-        <mc:Fallback>
+        <mc:Fallback xmlns="">
           <p:pic>
             <p:nvPicPr>
               <p:cNvPr id="7" name="Ink 6">
@@ -8324,8 +8364,8 @@
           </p:pic>
         </mc:Fallback>
       </mc:AlternateContent>
-      <mc:AlternateContent xmlns:mc="http://schemas.openxmlformats.org/markup-compatibility/2006">
-        <mc:Choice xmlns:p14="http://schemas.microsoft.com/office/powerpoint/2010/main" Requires="p14">
+      <mc:AlternateContent xmlns:mc="http://schemas.openxmlformats.org/markup-compatibility/2006" xmlns:p14="http://schemas.microsoft.com/office/powerpoint/2010/main">
+        <mc:Choice Requires="p14">
           <p:contentPart p14:bwMode="auto" r:id="rId7">
             <p14:nvContentPartPr>
               <p14:cNvPr id="8" name="Ink 7">
@@ -8344,7 +8384,7 @@
             </p14:xfrm>
           </p:contentPart>
         </mc:Choice>
-        <mc:Fallback>
+        <mc:Fallback xmlns="">
           <p:pic>
             <p:nvPicPr>
               <p:cNvPr id="8" name="Ink 7">
@@ -8375,8 +8415,8 @@
           </p:pic>
         </mc:Fallback>
       </mc:AlternateContent>
-      <mc:AlternateContent xmlns:mc="http://schemas.openxmlformats.org/markup-compatibility/2006">
-        <mc:Choice xmlns:p14="http://schemas.microsoft.com/office/powerpoint/2010/main" Requires="p14">
+      <mc:AlternateContent xmlns:mc="http://schemas.openxmlformats.org/markup-compatibility/2006" xmlns:p14="http://schemas.microsoft.com/office/powerpoint/2010/main">
+        <mc:Choice Requires="p14">
           <p:contentPart p14:bwMode="auto" r:id="rId9">
             <p14:nvContentPartPr>
               <p14:cNvPr id="9" name="Ink 8">
@@ -8395,7 +8435,7 @@
             </p14:xfrm>
           </p:contentPart>
         </mc:Choice>
-        <mc:Fallback>
+        <mc:Fallback xmlns="">
           <p:pic>
             <p:nvPicPr>
               <p:cNvPr id="9" name="Ink 8">
@@ -8426,8 +8466,8 @@
           </p:pic>
         </mc:Fallback>
       </mc:AlternateContent>
-      <mc:AlternateContent xmlns:mc="http://schemas.openxmlformats.org/markup-compatibility/2006">
-        <mc:Choice xmlns:p14="http://schemas.microsoft.com/office/powerpoint/2010/main" Requires="p14">
+      <mc:AlternateContent xmlns:mc="http://schemas.openxmlformats.org/markup-compatibility/2006" xmlns:p14="http://schemas.microsoft.com/office/powerpoint/2010/main">
+        <mc:Choice Requires="p14">
           <p:contentPart p14:bwMode="auto" r:id="rId11">
             <p14:nvContentPartPr>
               <p14:cNvPr id="10" name="Ink 9">
@@ -8446,7 +8486,7 @@
             </p14:xfrm>
           </p:contentPart>
         </mc:Choice>
-        <mc:Fallback>
+        <mc:Fallback xmlns="">
           <p:pic>
             <p:nvPicPr>
               <p:cNvPr id="10" name="Ink 9">
@@ -8477,8 +8517,8 @@
           </p:pic>
         </mc:Fallback>
       </mc:AlternateContent>
-      <mc:AlternateContent xmlns:mc="http://schemas.openxmlformats.org/markup-compatibility/2006">
-        <mc:Choice xmlns:p14="http://schemas.microsoft.com/office/powerpoint/2010/main" Requires="p14">
+      <mc:AlternateContent xmlns:mc="http://schemas.openxmlformats.org/markup-compatibility/2006" xmlns:p14="http://schemas.microsoft.com/office/powerpoint/2010/main">
+        <mc:Choice Requires="p14">
           <p:contentPart p14:bwMode="auto" r:id="rId13">
             <p14:nvContentPartPr>
               <p14:cNvPr id="11" name="Ink 10">
@@ -8497,7 +8537,7 @@
             </p14:xfrm>
           </p:contentPart>
         </mc:Choice>
-        <mc:Fallback>
+        <mc:Fallback xmlns="">
           <p:pic>
             <p:nvPicPr>
               <p:cNvPr id="11" name="Ink 10">
@@ -8528,8 +8568,8 @@
           </p:pic>
         </mc:Fallback>
       </mc:AlternateContent>
-      <mc:AlternateContent xmlns:mc="http://schemas.openxmlformats.org/markup-compatibility/2006">
-        <mc:Choice xmlns:p14="http://schemas.microsoft.com/office/powerpoint/2010/main" Requires="p14">
+      <mc:AlternateContent xmlns:mc="http://schemas.openxmlformats.org/markup-compatibility/2006" xmlns:p14="http://schemas.microsoft.com/office/powerpoint/2010/main">
+        <mc:Choice Requires="p14">
           <p:contentPart p14:bwMode="auto" r:id="rId15">
             <p14:nvContentPartPr>
               <p14:cNvPr id="12" name="Ink 11">
@@ -8548,7 +8588,7 @@
             </p14:xfrm>
           </p:contentPart>
         </mc:Choice>
-        <mc:Fallback>
+        <mc:Fallback xmlns="">
           <p:pic>
             <p:nvPicPr>
               <p:cNvPr id="12" name="Ink 11">
@@ -8579,8 +8619,8 @@
           </p:pic>
         </mc:Fallback>
       </mc:AlternateContent>
-      <mc:AlternateContent xmlns:mc="http://schemas.openxmlformats.org/markup-compatibility/2006">
-        <mc:Choice xmlns:p14="http://schemas.microsoft.com/office/powerpoint/2010/main" Requires="p14">
+      <mc:AlternateContent xmlns:mc="http://schemas.openxmlformats.org/markup-compatibility/2006" xmlns:p14="http://schemas.microsoft.com/office/powerpoint/2010/main">
+        <mc:Choice Requires="p14">
           <p:contentPart p14:bwMode="auto" r:id="rId17">
             <p14:nvContentPartPr>
               <p14:cNvPr id="13" name="Ink 12">
@@ -8599,7 +8639,7 @@
             </p14:xfrm>
           </p:contentPart>
         </mc:Choice>
-        <mc:Fallback>
+        <mc:Fallback xmlns="">
           <p:pic>
             <p:nvPicPr>
               <p:cNvPr id="13" name="Ink 12">
@@ -8630,8 +8670,8 @@
           </p:pic>
         </mc:Fallback>
       </mc:AlternateContent>
-      <mc:AlternateContent xmlns:mc="http://schemas.openxmlformats.org/markup-compatibility/2006">
-        <mc:Choice xmlns:p14="http://schemas.microsoft.com/office/powerpoint/2010/main" Requires="p14">
+      <mc:AlternateContent xmlns:mc="http://schemas.openxmlformats.org/markup-compatibility/2006" xmlns:p14="http://schemas.microsoft.com/office/powerpoint/2010/main">
+        <mc:Choice Requires="p14">
           <p:contentPart p14:bwMode="auto" r:id="rId19">
             <p14:nvContentPartPr>
               <p14:cNvPr id="14" name="Ink 13">
@@ -8650,7 +8690,7 @@
             </p14:xfrm>
           </p:contentPart>
         </mc:Choice>
-        <mc:Fallback>
+        <mc:Fallback xmlns="">
           <p:pic>
             <p:nvPicPr>
               <p:cNvPr id="14" name="Ink 13">
@@ -9720,8 +9760,8 @@
           </a:prstGeom>
         </p:spPr>
       </p:pic>
-      <mc:AlternateContent xmlns:mc="http://schemas.openxmlformats.org/markup-compatibility/2006">
-        <mc:Choice xmlns:p14="http://schemas.microsoft.com/office/powerpoint/2010/main" Requires="p14">
+      <mc:AlternateContent xmlns:mc="http://schemas.openxmlformats.org/markup-compatibility/2006" xmlns:p14="http://schemas.microsoft.com/office/powerpoint/2010/main">
+        <mc:Choice Requires="p14">
           <p:contentPart p14:bwMode="auto" r:id="rId3">
             <p14:nvContentPartPr>
               <p14:cNvPr id="11" name="Ink 10">
@@ -9740,7 +9780,7 @@
             </p14:xfrm>
           </p:contentPart>
         </mc:Choice>
-        <mc:Fallback>
+        <mc:Fallback xmlns="">
           <p:pic>
             <p:nvPicPr>
               <p:cNvPr id="11" name="Ink 10">
@@ -9771,8 +9811,8 @@
           </p:pic>
         </mc:Fallback>
       </mc:AlternateContent>
-      <mc:AlternateContent xmlns:mc="http://schemas.openxmlformats.org/markup-compatibility/2006">
-        <mc:Choice xmlns:p14="http://schemas.microsoft.com/office/powerpoint/2010/main" Requires="p14">
+      <mc:AlternateContent xmlns:mc="http://schemas.openxmlformats.org/markup-compatibility/2006" xmlns:p14="http://schemas.microsoft.com/office/powerpoint/2010/main">
+        <mc:Choice Requires="p14">
           <p:contentPart p14:bwMode="auto" r:id="rId5">
             <p14:nvContentPartPr>
               <p14:cNvPr id="12" name="Ink 11">
@@ -9791,7 +9831,7 @@
             </p14:xfrm>
           </p:contentPart>
         </mc:Choice>
-        <mc:Fallback>
+        <mc:Fallback xmlns="">
           <p:pic>
             <p:nvPicPr>
               <p:cNvPr id="12" name="Ink 11">
@@ -9822,8 +9862,8 @@
           </p:pic>
         </mc:Fallback>
       </mc:AlternateContent>
-      <mc:AlternateContent xmlns:mc="http://schemas.openxmlformats.org/markup-compatibility/2006">
-        <mc:Choice xmlns:p14="http://schemas.microsoft.com/office/powerpoint/2010/main" Requires="p14">
+      <mc:AlternateContent xmlns:mc="http://schemas.openxmlformats.org/markup-compatibility/2006" xmlns:p14="http://schemas.microsoft.com/office/powerpoint/2010/main">
+        <mc:Choice Requires="p14">
           <p:contentPart p14:bwMode="auto" r:id="rId7">
             <p14:nvContentPartPr>
               <p14:cNvPr id="13" name="Ink 12">
@@ -9842,7 +9882,7 @@
             </p14:xfrm>
           </p:contentPart>
         </mc:Choice>
-        <mc:Fallback>
+        <mc:Fallback xmlns="">
           <p:pic>
             <p:nvPicPr>
               <p:cNvPr id="13" name="Ink 12">
@@ -9873,8 +9913,8 @@
           </p:pic>
         </mc:Fallback>
       </mc:AlternateContent>
-      <mc:AlternateContent xmlns:mc="http://schemas.openxmlformats.org/markup-compatibility/2006">
-        <mc:Choice xmlns:p14="http://schemas.microsoft.com/office/powerpoint/2010/main" Requires="p14">
+      <mc:AlternateContent xmlns:mc="http://schemas.openxmlformats.org/markup-compatibility/2006" xmlns:p14="http://schemas.microsoft.com/office/powerpoint/2010/main">
+        <mc:Choice Requires="p14">
           <p:contentPart p14:bwMode="auto" r:id="rId9">
             <p14:nvContentPartPr>
               <p14:cNvPr id="14" name="Ink 13">
@@ -9893,7 +9933,7 @@
             </p14:xfrm>
           </p:contentPart>
         </mc:Choice>
-        <mc:Fallback>
+        <mc:Fallback xmlns="">
           <p:pic>
             <p:nvPicPr>
               <p:cNvPr id="14" name="Ink 13">
@@ -9924,8 +9964,8 @@
           </p:pic>
         </mc:Fallback>
       </mc:AlternateContent>
-      <mc:AlternateContent xmlns:mc="http://schemas.openxmlformats.org/markup-compatibility/2006">
-        <mc:Choice xmlns:p14="http://schemas.microsoft.com/office/powerpoint/2010/main" Requires="p14">
+      <mc:AlternateContent xmlns:mc="http://schemas.openxmlformats.org/markup-compatibility/2006" xmlns:p14="http://schemas.microsoft.com/office/powerpoint/2010/main">
+        <mc:Choice Requires="p14">
           <p:contentPart p14:bwMode="auto" r:id="rId11">
             <p14:nvContentPartPr>
               <p14:cNvPr id="15" name="Ink 14">
@@ -9944,7 +9984,7 @@
             </p14:xfrm>
           </p:contentPart>
         </mc:Choice>
-        <mc:Fallback>
+        <mc:Fallback xmlns="">
           <p:pic>
             <p:nvPicPr>
               <p:cNvPr id="15" name="Ink 14">
@@ -9975,8 +10015,8 @@
           </p:pic>
         </mc:Fallback>
       </mc:AlternateContent>
-      <mc:AlternateContent xmlns:mc="http://schemas.openxmlformats.org/markup-compatibility/2006">
-        <mc:Choice xmlns:p14="http://schemas.microsoft.com/office/powerpoint/2010/main" Requires="p14">
+      <mc:AlternateContent xmlns:mc="http://schemas.openxmlformats.org/markup-compatibility/2006" xmlns:p14="http://schemas.microsoft.com/office/powerpoint/2010/main">
+        <mc:Choice Requires="p14">
           <p:contentPart p14:bwMode="auto" r:id="rId13">
             <p14:nvContentPartPr>
               <p14:cNvPr id="16" name="Ink 15">
@@ -9995,7 +10035,7 @@
             </p14:xfrm>
           </p:contentPart>
         </mc:Choice>
-        <mc:Fallback>
+        <mc:Fallback xmlns="">
           <p:pic>
             <p:nvPicPr>
               <p:cNvPr id="16" name="Ink 15">
@@ -10026,8 +10066,8 @@
           </p:pic>
         </mc:Fallback>
       </mc:AlternateContent>
-      <mc:AlternateContent xmlns:mc="http://schemas.openxmlformats.org/markup-compatibility/2006">
-        <mc:Choice xmlns:p14="http://schemas.microsoft.com/office/powerpoint/2010/main" Requires="p14">
+      <mc:AlternateContent xmlns:mc="http://schemas.openxmlformats.org/markup-compatibility/2006" xmlns:p14="http://schemas.microsoft.com/office/powerpoint/2010/main">
+        <mc:Choice Requires="p14">
           <p:contentPart p14:bwMode="auto" r:id="rId15">
             <p14:nvContentPartPr>
               <p14:cNvPr id="17" name="Ink 16">
@@ -10046,7 +10086,7 @@
             </p14:xfrm>
           </p:contentPart>
         </mc:Choice>
-        <mc:Fallback>
+        <mc:Fallback xmlns="">
           <p:pic>
             <p:nvPicPr>
               <p:cNvPr id="17" name="Ink 16">
@@ -10077,8 +10117,8 @@
           </p:pic>
         </mc:Fallback>
       </mc:AlternateContent>
-      <mc:AlternateContent xmlns:mc="http://schemas.openxmlformats.org/markup-compatibility/2006">
-        <mc:Choice xmlns:p14="http://schemas.microsoft.com/office/powerpoint/2010/main" Requires="p14">
+      <mc:AlternateContent xmlns:mc="http://schemas.openxmlformats.org/markup-compatibility/2006" xmlns:p14="http://schemas.microsoft.com/office/powerpoint/2010/main">
+        <mc:Choice Requires="p14">
           <p:contentPart p14:bwMode="auto" r:id="rId17">
             <p14:nvContentPartPr>
               <p14:cNvPr id="18" name="Ink 17">
@@ -10097,7 +10137,7 @@
             </p14:xfrm>
           </p:contentPart>
         </mc:Choice>
-        <mc:Fallback>
+        <mc:Fallback xmlns="">
           <p:pic>
             <p:nvPicPr>
               <p:cNvPr id="18" name="Ink 17">
@@ -10128,8 +10168,8 @@
           </p:pic>
         </mc:Fallback>
       </mc:AlternateContent>
-      <mc:AlternateContent xmlns:mc="http://schemas.openxmlformats.org/markup-compatibility/2006">
-        <mc:Choice xmlns:p14="http://schemas.microsoft.com/office/powerpoint/2010/main" Requires="p14">
+      <mc:AlternateContent xmlns:mc="http://schemas.openxmlformats.org/markup-compatibility/2006" xmlns:p14="http://schemas.microsoft.com/office/powerpoint/2010/main">
+        <mc:Choice Requires="p14">
           <p:contentPart p14:bwMode="auto" r:id="rId19">
             <p14:nvContentPartPr>
               <p14:cNvPr id="19" name="Ink 18">
@@ -10148,7 +10188,7 @@
             </p14:xfrm>
           </p:contentPart>
         </mc:Choice>
-        <mc:Fallback>
+        <mc:Fallback xmlns="">
           <p:pic>
             <p:nvPicPr>
               <p:cNvPr id="19" name="Ink 18">
@@ -12478,13 +12518,7 @@
               <a:rPr lang="en-CA" dirty="0">
                 <a:hlinkClick r:id="rId2"/>
               </a:rPr>
-              <a:t>https://www.fool.com/investing/stock-market/types-of-stocks/safe-stock</a:t>
-            </a:r>
-            <a:r>
-              <a:rPr lang="en-CA" dirty="0">
-                <a:hlinkClick r:id="rId2"/>
-              </a:rPr>
-              <a:t>s</a:t>
+              <a:t>https://www.fool.com/investing/stock-market/types-of-stocks/safe-stocks</a:t>
             </a:r>
             <a:endParaRPr lang="en-CA" dirty="0"/>
           </a:p>
@@ -13627,8 +13661,8 @@
           </a:p>
         </p:txBody>
       </p:sp>
-      <mc:AlternateContent xmlns:mc="http://schemas.openxmlformats.org/markup-compatibility/2006">
-        <mc:Choice xmlns:a14="http://schemas.microsoft.com/office/drawing/2010/main" Requires="a14">
+      <mc:AlternateContent xmlns:mc="http://schemas.openxmlformats.org/markup-compatibility/2006" xmlns:a14="http://schemas.microsoft.com/office/drawing/2010/main">
+        <mc:Choice Requires="a14">
           <p:sp>
             <p:nvSpPr>
               <p:cNvPr id="3" name="Content Placeholder 2">
@@ -13872,7 +13906,7 @@
             </p:txBody>
           </p:sp>
         </mc:Choice>
-        <mc:Fallback>
+        <mc:Fallback xmlns="">
           <p:sp>
             <p:nvSpPr>
               <p:cNvPr id="3" name="Content Placeholder 2">

</xml_diff>